<commit_message>
Final script edits, manuscript revision 1
</commit_message>
<xml_diff>
--- a/manuscript_figures/Fig1.pptx
+++ b/manuscript_figures/Fig1.pptx
@@ -302,7 +302,7 @@
           <a:p>
             <a:fld id="{8C38451F-E327-0E44-85D7-E441B77E43AC}" type="datetimeFigureOut">
               <a:rPr lang="en-US" smtClean="0"/>
-              <a:t>1/29/19</a:t>
+              <a:t>3/25/19</a:t>
             </a:fld>
             <a:endParaRPr lang="en-US"/>
           </a:p>
@@ -470,7 +470,7 @@
           <a:p>
             <a:fld id="{8C38451F-E327-0E44-85D7-E441B77E43AC}" type="datetimeFigureOut">
               <a:rPr lang="en-US" smtClean="0"/>
-              <a:t>1/29/19</a:t>
+              <a:t>3/25/19</a:t>
             </a:fld>
             <a:endParaRPr lang="en-US"/>
           </a:p>
@@ -648,7 +648,7 @@
           <a:p>
             <a:fld id="{8C38451F-E327-0E44-85D7-E441B77E43AC}" type="datetimeFigureOut">
               <a:rPr lang="en-US" smtClean="0"/>
-              <a:t>1/29/19</a:t>
+              <a:t>3/25/19</a:t>
             </a:fld>
             <a:endParaRPr lang="en-US"/>
           </a:p>
@@ -816,7 +816,7 @@
           <a:p>
             <a:fld id="{8C38451F-E327-0E44-85D7-E441B77E43AC}" type="datetimeFigureOut">
               <a:rPr lang="en-US" smtClean="0"/>
-              <a:t>1/29/19</a:t>
+              <a:t>3/25/19</a:t>
             </a:fld>
             <a:endParaRPr lang="en-US"/>
           </a:p>
@@ -1061,7 +1061,7 @@
           <a:p>
             <a:fld id="{8C38451F-E327-0E44-85D7-E441B77E43AC}" type="datetimeFigureOut">
               <a:rPr lang="en-US" smtClean="0"/>
-              <a:t>1/29/19</a:t>
+              <a:t>3/25/19</a:t>
             </a:fld>
             <a:endParaRPr lang="en-US"/>
           </a:p>
@@ -1346,7 +1346,7 @@
           <a:p>
             <a:fld id="{8C38451F-E327-0E44-85D7-E441B77E43AC}" type="datetimeFigureOut">
               <a:rPr lang="en-US" smtClean="0"/>
-              <a:t>1/29/19</a:t>
+              <a:t>3/25/19</a:t>
             </a:fld>
             <a:endParaRPr lang="en-US"/>
           </a:p>
@@ -1765,7 +1765,7 @@
           <a:p>
             <a:fld id="{8C38451F-E327-0E44-85D7-E441B77E43AC}" type="datetimeFigureOut">
               <a:rPr lang="en-US" smtClean="0"/>
-              <a:t>1/29/19</a:t>
+              <a:t>3/25/19</a:t>
             </a:fld>
             <a:endParaRPr lang="en-US"/>
           </a:p>
@@ -1882,7 +1882,7 @@
           <a:p>
             <a:fld id="{8C38451F-E327-0E44-85D7-E441B77E43AC}" type="datetimeFigureOut">
               <a:rPr lang="en-US" smtClean="0"/>
-              <a:t>1/29/19</a:t>
+              <a:t>3/25/19</a:t>
             </a:fld>
             <a:endParaRPr lang="en-US"/>
           </a:p>
@@ -1977,7 +1977,7 @@
           <a:p>
             <a:fld id="{8C38451F-E327-0E44-85D7-E441B77E43AC}" type="datetimeFigureOut">
               <a:rPr lang="en-US" smtClean="0"/>
-              <a:t>1/29/19</a:t>
+              <a:t>3/25/19</a:t>
             </a:fld>
             <a:endParaRPr lang="en-US"/>
           </a:p>
@@ -2252,7 +2252,7 @@
           <a:p>
             <a:fld id="{8C38451F-E327-0E44-85D7-E441B77E43AC}" type="datetimeFigureOut">
               <a:rPr lang="en-US" smtClean="0"/>
-              <a:t>1/29/19</a:t>
+              <a:t>3/25/19</a:t>
             </a:fld>
             <a:endParaRPr lang="en-US"/>
           </a:p>
@@ -2507,7 +2507,7 @@
           <a:p>
             <a:fld id="{8C38451F-E327-0E44-85D7-E441B77E43AC}" type="datetimeFigureOut">
               <a:rPr lang="en-US" smtClean="0"/>
-              <a:t>1/29/19</a:t>
+              <a:t>3/25/19</a:t>
             </a:fld>
             <a:endParaRPr lang="en-US"/>
           </a:p>
@@ -2718,7 +2718,7 @@
           <a:p>
             <a:fld id="{8C38451F-E327-0E44-85D7-E441B77E43AC}" type="datetimeFigureOut">
               <a:rPr lang="en-US" smtClean="0"/>
-              <a:t>1/29/19</a:t>
+              <a:t>3/25/19</a:t>
             </a:fld>
             <a:endParaRPr lang="en-US"/>
           </a:p>
@@ -3107,7 +3107,7 @@
         </p:nvSpPr>
         <p:spPr>
           <a:xfrm>
-            <a:off x="1445307" y="2068370"/>
+            <a:off x="1704905" y="2068374"/>
             <a:ext cx="1077652" cy="370839"/>
           </a:xfrm>
           <a:prstGeom prst="rect">
@@ -3154,7 +3154,7 @@
         </p:nvSpPr>
         <p:spPr>
           <a:xfrm>
-            <a:off x="1445309" y="1281405"/>
+            <a:off x="1704907" y="1281409"/>
             <a:ext cx="1077652" cy="714147"/>
           </a:xfrm>
           <a:prstGeom prst="rect">
@@ -3210,14 +3210,16 @@
         </p:nvSpPr>
         <p:spPr>
           <a:xfrm>
-            <a:off x="453936" y="1215458"/>
-            <a:ext cx="846726" cy="910763"/>
+            <a:off x="805124" y="1281407"/>
+            <a:ext cx="846726" cy="714149"/>
           </a:xfrm>
           <a:prstGeom prst="rightArrow">
             <a:avLst/>
           </a:prstGeom>
           <a:solidFill>
-            <a:srgbClr val="251A53"/>
+            <a:schemeClr val="bg1">
+              <a:lumMod val="75000"/>
+            </a:schemeClr>
           </a:solidFill>
           <a:ln>
             <a:noFill/>
@@ -3258,7 +3260,7 @@
         </p:nvSpPr>
         <p:spPr>
           <a:xfrm>
-            <a:off x="2752335" y="1281405"/>
+            <a:off x="3011933" y="1281409"/>
             <a:ext cx="1077652" cy="714148"/>
           </a:xfrm>
           <a:prstGeom prst="rect">
@@ -3314,7 +3316,7 @@
         </p:nvSpPr>
         <p:spPr>
           <a:xfrm>
-            <a:off x="4059363" y="1281403"/>
+            <a:off x="4318961" y="1281407"/>
             <a:ext cx="1077652" cy="714149"/>
           </a:xfrm>
           <a:prstGeom prst="rect">
@@ -3370,7 +3372,7 @@
                 <a:latin typeface="Helvetica"/>
                 <a:cs typeface="Helvetica"/>
               </a:rPr>
-              <a:t>Surviving leptospires reproduce</a:t>
+              <a:t>Surviving leptospires establish and reproduce</a:t>
             </a:r>
           </a:p>
         </p:txBody>
@@ -3383,7 +3385,7 @@
         </p:nvSpPr>
         <p:spPr>
           <a:xfrm>
-            <a:off x="2076510" y="950708"/>
+            <a:off x="2336108" y="950712"/>
             <a:ext cx="1161041" cy="526523"/>
           </a:xfrm>
           <a:prstGeom prst="arc">
@@ -3438,7 +3440,7 @@
         </p:nvSpPr>
         <p:spPr>
           <a:xfrm>
-            <a:off x="2526990" y="634520"/>
+            <a:off x="2786588" y="634524"/>
             <a:ext cx="667118" cy="307777"/>
           </a:xfrm>
           <a:prstGeom prst="rect">
@@ -3482,7 +3484,7 @@
         </p:nvSpPr>
         <p:spPr>
           <a:xfrm>
-            <a:off x="3870364" y="634521"/>
+            <a:off x="4129962" y="634525"/>
             <a:ext cx="418311" cy="307777"/>
           </a:xfrm>
           <a:prstGeom prst="rect">
@@ -3522,8 +3524,8 @@
         </p:nvSpPr>
         <p:spPr>
           <a:xfrm>
-            <a:off x="194783" y="2160618"/>
-            <a:ext cx="1135063" cy="338554"/>
+            <a:off x="37092" y="2161368"/>
+            <a:ext cx="1135063" cy="215444"/>
           </a:xfrm>
           <a:prstGeom prst="rect">
             <a:avLst/>
@@ -3542,7 +3544,7 @@
                 <a:latin typeface="Helvetica"/>
                 <a:cs typeface="Helvetica"/>
               </a:rPr>
-              <a:t>Expected # surviving leptospires</a:t>
+              <a:t># leptospires</a:t>
             </a:r>
           </a:p>
         </p:txBody>
@@ -3556,20 +3558,20 @@
           <p:nvPr>
             <p:extLst>
               <p:ext uri="{D42A27DB-BD31-4B8C-83A1-F6EECF244321}">
-                <p14:modId xmlns:p14="http://schemas.microsoft.com/office/powerpoint/2010/main" val="952064239"/>
+                <p14:modId xmlns:p14="http://schemas.microsoft.com/office/powerpoint/2010/main" val="3954672987"/>
               </p:ext>
             </p:extLst>
           </p:nvPr>
         </p:nvGraphicFramePr>
         <p:xfrm>
-          <a:off x="3343005" y="1814393"/>
+          <a:off x="3602603" y="1814397"/>
           <a:ext cx="114300" cy="165100"/>
         </p:xfrm>
         <a:graphic>
           <a:graphicData uri="http://schemas.openxmlformats.org/presentationml/2006/ole">
             <mc:AlternateContent xmlns:mc="http://schemas.openxmlformats.org/markup-compatibility/2006">
               <mc:Choice xmlns:v="urn:schemas-microsoft-com:vml" Requires="v">
-                <p:oleObj spid="_x0000_s1035" name="Equation" r:id="rId3" imgW="114300" imgH="165100" progId="Equation.3">
+                <p:oleObj spid="_x0000_s1039" name="Equation" r:id="rId3" imgW="114300" imgH="165100" progId="Equation.3">
                   <p:embed/>
                 </p:oleObj>
               </mc:Choice>
@@ -3590,7 +3592,7 @@
                     </p:blipFill>
                     <p:spPr>
                       <a:xfrm>
-                        <a:off x="3343005" y="1814393"/>
+                        <a:off x="3602603" y="1814397"/>
                         <a:ext cx="114300" cy="165100"/>
                       </a:xfrm>
                       <a:prstGeom prst="rect">
@@ -3612,8 +3614,8 @@
         </p:nvSpPr>
         <p:spPr>
           <a:xfrm>
-            <a:off x="453936" y="1538245"/>
-            <a:ext cx="726431" cy="246221"/>
+            <a:off x="805124" y="1515370"/>
+            <a:ext cx="723275" cy="246221"/>
           </a:xfrm>
           <a:prstGeom prst="rect">
             <a:avLst/>
@@ -3628,9 +3630,6 @@
           <a:p>
             <a:r>
               <a:rPr lang="en-US" dirty="0">
-                <a:solidFill>
-                  <a:schemeClr val="bg1"/>
-                </a:solidFill>
                 <a:latin typeface="Helvetica"/>
                 <a:cs typeface="Helvetica"/>
               </a:rPr>
@@ -3653,7 +3652,7 @@
         </p:nvSpPr>
         <p:spPr>
           <a:xfrm>
-            <a:off x="3457305" y="963414"/>
+            <a:off x="3716903" y="963418"/>
             <a:ext cx="1161041" cy="526523"/>
           </a:xfrm>
           <a:prstGeom prst="arc">
@@ -3714,7 +3713,7 @@
         </p:nvSpPr>
         <p:spPr>
           <a:xfrm>
-            <a:off x="2057400" y="118570"/>
+            <a:off x="2316998" y="118570"/>
             <a:ext cx="1371600" cy="461665"/>
           </a:xfrm>
           <a:prstGeom prst="rect">
@@ -3760,7 +3759,7 @@
         </p:nvSpPr>
         <p:spPr>
           <a:xfrm>
-            <a:off x="3560108" y="118570"/>
+            <a:off x="3819706" y="118570"/>
             <a:ext cx="1371600" cy="584775"/>
           </a:xfrm>
           <a:prstGeom prst="rect">
@@ -3806,7 +3805,7 @@
         </p:nvSpPr>
         <p:spPr>
           <a:xfrm>
-            <a:off x="1814054" y="2122984"/>
+            <a:off x="2073652" y="2122988"/>
             <a:ext cx="340158" cy="261610"/>
           </a:xfrm>
           <a:prstGeom prst="rect">
@@ -3857,7 +3856,7 @@
         </p:nvSpPr>
         <p:spPr>
           <a:xfrm>
-            <a:off x="2752335" y="2128396"/>
+            <a:off x="3011933" y="2128400"/>
             <a:ext cx="1077652" cy="253698"/>
           </a:xfrm>
           <a:prstGeom prst="rect">
@@ -3910,7 +3909,7 @@
         </p:nvSpPr>
         <p:spPr>
           <a:xfrm>
-            <a:off x="3117147" y="2115073"/>
+            <a:off x="3376745" y="2115077"/>
             <a:ext cx="354584" cy="261610"/>
           </a:xfrm>
           <a:prstGeom prst="rect">
@@ -3968,7 +3967,7 @@
         </p:nvSpPr>
         <p:spPr>
           <a:xfrm>
-            <a:off x="4059755" y="2187673"/>
+            <a:off x="4319353" y="2187677"/>
             <a:ext cx="1077652" cy="152923"/>
           </a:xfrm>
           <a:prstGeom prst="rect">
@@ -4021,7 +4020,7 @@
         </p:nvSpPr>
         <p:spPr>
           <a:xfrm>
-            <a:off x="4424567" y="2136716"/>
+            <a:off x="4684165" y="2136720"/>
             <a:ext cx="312906" cy="261610"/>
           </a:xfrm>
           <a:prstGeom prst="rect">
@@ -4072,7 +4071,7 @@
         </p:nvSpPr>
         <p:spPr>
           <a:xfrm>
-            <a:off x="2511443" y="2132811"/>
+            <a:off x="2771041" y="2132815"/>
             <a:ext cx="231757" cy="246221"/>
           </a:xfrm>
           <a:prstGeom prst="rect">
@@ -4111,7 +4110,7 @@
         </p:nvSpPr>
         <p:spPr>
           <a:xfrm>
-            <a:off x="3798196" y="2130462"/>
+            <a:off x="4057794" y="2130466"/>
             <a:ext cx="231757" cy="246221"/>
           </a:xfrm>
           <a:prstGeom prst="rect">
@@ -4150,8 +4149,8 @@
         </p:nvSpPr>
         <p:spPr>
           <a:xfrm>
-            <a:off x="264039" y="773020"/>
-            <a:ext cx="1293802" cy="338554"/>
+            <a:off x="37092" y="714899"/>
+            <a:ext cx="2063069" cy="215444"/>
           </a:xfrm>
           <a:prstGeom prst="rect">
             <a:avLst/>
@@ -4185,6 +4184,101 @@
                 <a:cs typeface="Helvetica"/>
               </a:rPr>
               <a:t> probability of survival</a:t>
+            </a:r>
+          </a:p>
+        </p:txBody>
+      </p:sp>
+      <p:sp>
+        <p:nvSpPr>
+          <p:cNvPr id="25" name="Rectangle 24">
+            <a:extLst>
+              <a:ext uri="{FF2B5EF4-FFF2-40B4-BE49-F238E27FC236}">
+                <a16:creationId xmlns:a16="http://schemas.microsoft.com/office/drawing/2014/main" id="{960092B3-84FE-374E-AAA9-CD6D67E6EDE1}"/>
+              </a:ext>
+            </a:extLst>
+          </p:cNvPr>
+          <p:cNvSpPr/>
+          <p:nvPr/>
+        </p:nvSpPr>
+        <p:spPr>
+          <a:xfrm>
+            <a:off x="798693" y="2068374"/>
+            <a:ext cx="801507" cy="370839"/>
+          </a:xfrm>
+          <a:prstGeom prst="rect">
+            <a:avLst/>
+          </a:prstGeom>
+          <a:solidFill>
+            <a:srgbClr val="251A53"/>
+          </a:solidFill>
+          <a:ln>
+            <a:solidFill>
+              <a:srgbClr val="251A53"/>
+            </a:solidFill>
+          </a:ln>
+          <a:effectLst/>
+        </p:spPr>
+        <p:style>
+          <a:lnRef idx="1">
+            <a:schemeClr val="accent1"/>
+          </a:lnRef>
+          <a:fillRef idx="3">
+            <a:schemeClr val="accent1"/>
+          </a:fillRef>
+          <a:effectRef idx="2">
+            <a:schemeClr val="accent1"/>
+          </a:effectRef>
+          <a:fontRef idx="minor">
+            <a:schemeClr val="lt1"/>
+          </a:fontRef>
+        </p:style>
+        <p:txBody>
+          <a:bodyPr rtlCol="0" anchor="ctr"/>
+          <a:lstStyle/>
+          <a:p>
+            <a:pPr algn="ctr"/>
+            <a:endParaRPr lang="en-US"/>
+          </a:p>
+        </p:txBody>
+      </p:sp>
+      <p:sp>
+        <p:nvSpPr>
+          <p:cNvPr id="34" name="TextBox 33">
+            <a:extLst>
+              <a:ext uri="{FF2B5EF4-FFF2-40B4-BE49-F238E27FC236}">
+                <a16:creationId xmlns:a16="http://schemas.microsoft.com/office/drawing/2014/main" id="{B8957141-9732-7247-B5BC-934F4031A8BE}"/>
+              </a:ext>
+            </a:extLst>
+          </p:cNvPr>
+          <p:cNvSpPr txBox="1"/>
+          <p:nvPr/>
+        </p:nvSpPr>
+        <p:spPr>
+          <a:xfrm>
+            <a:off x="798693" y="2029464"/>
+            <a:ext cx="801507" cy="415498"/>
+          </a:xfrm>
+          <a:prstGeom prst="rect">
+            <a:avLst/>
+          </a:prstGeom>
+          <a:noFill/>
+        </p:spPr>
+        <p:txBody>
+          <a:bodyPr wrap="square" rtlCol="0">
+            <a:spAutoFit/>
+          </a:bodyPr>
+          <a:lstStyle/>
+          <a:p>
+            <a:pPr algn="ctr"/>
+            <a:r>
+              <a:rPr lang="en-US" sz="1050" baseline="-25000" dirty="0">
+                <a:solidFill>
+                  <a:schemeClr val="bg1"/>
+                </a:solidFill>
+                <a:latin typeface="Helvetica"/>
+                <a:cs typeface="Helvetica"/>
+              </a:rPr>
+              <a:t>Average of d organisms in inoculum</a:t>
             </a:r>
           </a:p>
         </p:txBody>

</xml_diff>